<commit_message>
Add Add and remove buttons to configuration gui mockup
</commit_message>
<xml_diff>
--- a/GUI MOCKUP.pptx
+++ b/GUI MOCKUP.pptx
@@ -267,7 +267,7 @@
           <a:p>
             <a:fld id="{6C428871-47CA-4D52-AC09-4F3D29F86D96}" type="datetimeFigureOut">
               <a:rPr lang="en-CA" smtClean="0"/>
-              <a:t>2017-12-18</a:t>
+              <a:t>2018-01-09</a:t>
             </a:fld>
             <a:endParaRPr lang="en-CA"/>
           </a:p>
@@ -467,7 +467,7 @@
           <a:p>
             <a:fld id="{6C428871-47CA-4D52-AC09-4F3D29F86D96}" type="datetimeFigureOut">
               <a:rPr lang="en-CA" smtClean="0"/>
-              <a:t>2017-12-18</a:t>
+              <a:t>2018-01-09</a:t>
             </a:fld>
             <a:endParaRPr lang="en-CA"/>
           </a:p>
@@ -677,7 +677,7 @@
           <a:p>
             <a:fld id="{6C428871-47CA-4D52-AC09-4F3D29F86D96}" type="datetimeFigureOut">
               <a:rPr lang="en-CA" smtClean="0"/>
-              <a:t>2017-12-18</a:t>
+              <a:t>2018-01-09</a:t>
             </a:fld>
             <a:endParaRPr lang="en-CA"/>
           </a:p>
@@ -877,7 +877,7 @@
           <a:p>
             <a:fld id="{6C428871-47CA-4D52-AC09-4F3D29F86D96}" type="datetimeFigureOut">
               <a:rPr lang="en-CA" smtClean="0"/>
-              <a:t>2017-12-18</a:t>
+              <a:t>2018-01-09</a:t>
             </a:fld>
             <a:endParaRPr lang="en-CA"/>
           </a:p>
@@ -1153,7 +1153,7 @@
           <a:p>
             <a:fld id="{6C428871-47CA-4D52-AC09-4F3D29F86D96}" type="datetimeFigureOut">
               <a:rPr lang="en-CA" smtClean="0"/>
-              <a:t>2017-12-18</a:t>
+              <a:t>2018-01-09</a:t>
             </a:fld>
             <a:endParaRPr lang="en-CA"/>
           </a:p>
@@ -1421,7 +1421,7 @@
           <a:p>
             <a:fld id="{6C428871-47CA-4D52-AC09-4F3D29F86D96}" type="datetimeFigureOut">
               <a:rPr lang="en-CA" smtClean="0"/>
-              <a:t>2017-12-18</a:t>
+              <a:t>2018-01-09</a:t>
             </a:fld>
             <a:endParaRPr lang="en-CA"/>
           </a:p>
@@ -1836,7 +1836,7 @@
           <a:p>
             <a:fld id="{6C428871-47CA-4D52-AC09-4F3D29F86D96}" type="datetimeFigureOut">
               <a:rPr lang="en-CA" smtClean="0"/>
-              <a:t>2017-12-18</a:t>
+              <a:t>2018-01-09</a:t>
             </a:fld>
             <a:endParaRPr lang="en-CA"/>
           </a:p>
@@ -1978,7 +1978,7 @@
           <a:p>
             <a:fld id="{6C428871-47CA-4D52-AC09-4F3D29F86D96}" type="datetimeFigureOut">
               <a:rPr lang="en-CA" smtClean="0"/>
-              <a:t>2017-12-18</a:t>
+              <a:t>2018-01-09</a:t>
             </a:fld>
             <a:endParaRPr lang="en-CA"/>
           </a:p>
@@ -2091,7 +2091,7 @@
           <a:p>
             <a:fld id="{6C428871-47CA-4D52-AC09-4F3D29F86D96}" type="datetimeFigureOut">
               <a:rPr lang="en-CA" smtClean="0"/>
-              <a:t>2017-12-18</a:t>
+              <a:t>2018-01-09</a:t>
             </a:fld>
             <a:endParaRPr lang="en-CA"/>
           </a:p>
@@ -2404,7 +2404,7 @@
           <a:p>
             <a:fld id="{6C428871-47CA-4D52-AC09-4F3D29F86D96}" type="datetimeFigureOut">
               <a:rPr lang="en-CA" smtClean="0"/>
-              <a:t>2017-12-18</a:t>
+              <a:t>2018-01-09</a:t>
             </a:fld>
             <a:endParaRPr lang="en-CA"/>
           </a:p>
@@ -2693,7 +2693,7 @@
           <a:p>
             <a:fld id="{6C428871-47CA-4D52-AC09-4F3D29F86D96}" type="datetimeFigureOut">
               <a:rPr lang="en-CA" smtClean="0"/>
-              <a:t>2017-12-18</a:t>
+              <a:t>2018-01-09</a:t>
             </a:fld>
             <a:endParaRPr lang="en-CA"/>
           </a:p>
@@ -2936,7 +2936,7 @@
           <a:p>
             <a:fld id="{6C428871-47CA-4D52-AC09-4F3D29F86D96}" type="datetimeFigureOut">
               <a:rPr lang="en-CA" smtClean="0"/>
-              <a:t>2017-12-18</a:t>
+              <a:t>2018-01-09</a:t>
             </a:fld>
             <a:endParaRPr lang="en-CA"/>
           </a:p>
@@ -7540,7 +7540,7 @@
         <p:spPr>
           <a:xfrm>
             <a:off x="1716215" y="2849115"/>
-            <a:ext cx="5822590" cy="2952673"/>
+            <a:ext cx="4527829" cy="2952673"/>
           </a:xfrm>
           <a:prstGeom prst="rect">
             <a:avLst/>
@@ -7588,7 +7588,7 @@
                   <a:schemeClr val="tx1"/>
                 </a:solidFill>
               </a:rPr>
-              <a:t>parameters</a:t>
+              <a:t>parameters :</a:t>
             </a:r>
           </a:p>
         </p:txBody>
@@ -7824,6 +7824,146 @@
           </p:txBody>
         </p:sp>
       </p:grpSp>
+      <p:sp>
+        <p:nvSpPr>
+          <p:cNvPr id="26" name="Rectangle : coins arrondis 25">
+            <a:extLst>
+              <a:ext uri="{FF2B5EF4-FFF2-40B4-BE49-F238E27FC236}">
+                <a16:creationId xmlns:a16="http://schemas.microsoft.com/office/drawing/2014/main" id="{6CA93551-97D3-49FE-A785-9C2195153CD2}"/>
+              </a:ext>
+            </a:extLst>
+          </p:cNvPr>
+          <p:cNvSpPr/>
+          <p:nvPr/>
+        </p:nvSpPr>
+        <p:spPr>
+          <a:xfrm>
+            <a:off x="6375303" y="3208938"/>
+            <a:ext cx="1216924" cy="379552"/>
+          </a:xfrm>
+          <a:prstGeom prst="roundRect">
+            <a:avLst/>
+          </a:prstGeom>
+          <a:noFill/>
+          <a:ln>
+            <a:solidFill>
+              <a:schemeClr val="tx1"/>
+            </a:solidFill>
+          </a:ln>
+        </p:spPr>
+        <p:style>
+          <a:lnRef idx="2">
+            <a:schemeClr val="accent1">
+              <a:shade val="50000"/>
+            </a:schemeClr>
+          </a:lnRef>
+          <a:fillRef idx="1">
+            <a:schemeClr val="accent1"/>
+          </a:fillRef>
+          <a:effectRef idx="0">
+            <a:schemeClr val="accent1"/>
+          </a:effectRef>
+          <a:fontRef idx="minor">
+            <a:schemeClr val="lt1"/>
+          </a:fontRef>
+        </p:style>
+        <p:txBody>
+          <a:bodyPr rtlCol="0" anchor="ctr"/>
+          <a:lstStyle/>
+          <a:p>
+            <a:pPr algn="ctr"/>
+            <a:r>
+              <a:rPr lang="fr-CA" dirty="0">
+                <a:solidFill>
+                  <a:schemeClr val="tx1">
+                    <a:lumMod val="95000"/>
+                    <a:lumOff val="5000"/>
+                  </a:schemeClr>
+                </a:solidFill>
+              </a:rPr>
+              <a:t>ADD</a:t>
+            </a:r>
+            <a:endParaRPr lang="en-CA" dirty="0">
+              <a:solidFill>
+                <a:schemeClr val="tx1">
+                  <a:lumMod val="95000"/>
+                  <a:lumOff val="5000"/>
+                </a:schemeClr>
+              </a:solidFill>
+            </a:endParaRPr>
+          </a:p>
+        </p:txBody>
+      </p:sp>
+      <p:sp>
+        <p:nvSpPr>
+          <p:cNvPr id="27" name="Rectangle : coins arrondis 26">
+            <a:extLst>
+              <a:ext uri="{FF2B5EF4-FFF2-40B4-BE49-F238E27FC236}">
+                <a16:creationId xmlns:a16="http://schemas.microsoft.com/office/drawing/2014/main" id="{6197DCE2-1DF1-451D-8A01-626E80710132}"/>
+              </a:ext>
+            </a:extLst>
+          </p:cNvPr>
+          <p:cNvSpPr/>
+          <p:nvPr/>
+        </p:nvSpPr>
+        <p:spPr>
+          <a:xfrm>
+            <a:off x="6375303" y="3666871"/>
+            <a:ext cx="1216924" cy="379552"/>
+          </a:xfrm>
+          <a:prstGeom prst="roundRect">
+            <a:avLst/>
+          </a:prstGeom>
+          <a:noFill/>
+          <a:ln>
+            <a:solidFill>
+              <a:schemeClr val="tx1"/>
+            </a:solidFill>
+          </a:ln>
+        </p:spPr>
+        <p:style>
+          <a:lnRef idx="2">
+            <a:schemeClr val="accent1">
+              <a:shade val="50000"/>
+            </a:schemeClr>
+          </a:lnRef>
+          <a:fillRef idx="1">
+            <a:schemeClr val="accent1"/>
+          </a:fillRef>
+          <a:effectRef idx="0">
+            <a:schemeClr val="accent1"/>
+          </a:effectRef>
+          <a:fontRef idx="minor">
+            <a:schemeClr val="lt1"/>
+          </a:fontRef>
+        </p:style>
+        <p:txBody>
+          <a:bodyPr rtlCol="0" anchor="ctr"/>
+          <a:lstStyle/>
+          <a:p>
+            <a:pPr algn="ctr"/>
+            <a:r>
+              <a:rPr lang="fr-CA" dirty="0">
+                <a:solidFill>
+                  <a:schemeClr val="tx1">
+                    <a:lumMod val="95000"/>
+                    <a:lumOff val="5000"/>
+                  </a:schemeClr>
+                </a:solidFill>
+              </a:rPr>
+              <a:t>REMOVE</a:t>
+            </a:r>
+            <a:endParaRPr lang="en-CA" dirty="0">
+              <a:solidFill>
+                <a:schemeClr val="tx1">
+                  <a:lumMod val="95000"/>
+                  <a:lumOff val="5000"/>
+                </a:schemeClr>
+              </a:solidFill>
+            </a:endParaRPr>
+          </a:p>
+        </p:txBody>
+      </p:sp>
     </p:spTree>
     <p:extLst>
       <p:ext uri="{BB962C8B-B14F-4D97-AF65-F5344CB8AC3E}">

</xml_diff>